<commit_message>
futzed unsuccessfully with slide numbers in L0.3
</commit_message>
<xml_diff>
--- a/Slides/Lesson 0.3 Academic Honesty.pptx
+++ b/Slides/Lesson 0.3 Academic Honesty.pptx
@@ -10325,6 +10325,7 @@
     <p:sldLayoutId id="2147483664" r:id="rId11"/>
     <p:sldLayoutId id="2147483665" r:id="rId12"/>
   </p:sldLayoutIdLst>
+  <p:hf hdr="0" ftr="0" dt="0"/>
   <p:txStyles>
     <p:titleStyle>
       <a:defPPr marR="0" algn="l" rtl="0">
@@ -10967,46 +10968,6 @@
           </a:p>
         </p:txBody>
       </p:sp>
-      <p:sp>
-        <p:nvSpPr>
-          <p:cNvPr id="106" name="Shape 106"/>
-          <p:cNvSpPr txBox="1">
-            <a:spLocks noGrp="1"/>
-          </p:cNvSpPr>
-          <p:nvPr>
-            <p:ph type="sldNum" idx="12"/>
-          </p:nvPr>
-        </p:nvSpPr>
-        <p:spPr>
-          <a:xfrm>
-            <a:off x="6553200" y="6356350"/>
-            <a:ext cx="2133599" cy="365099"/>
-          </a:xfrm>
-          <a:prstGeom prst="rect">
-            <a:avLst/>
-          </a:prstGeom>
-          <a:noFill/>
-          <a:ln>
-            <a:noFill/>
-          </a:ln>
-        </p:spPr>
-        <p:txBody>
-          <a:bodyPr lIns="91425" tIns="45700" rIns="91425" bIns="45700" anchor="ctr" anchorCtr="0">
-            <a:noAutofit/>
-          </a:bodyPr>
-          <a:lstStyle/>
-          <a:p>
-            <a:pPr marL="0" marR="0" lvl="0" indent="0" algn="r" rtl="0">
-              <a:buSzPct val="25000"/>
-              <a:buNone/>
-            </a:pPr>
-            <a:r>
-              <a:rPr lang="en"/>
-              <a:t> </a:t>
-            </a:r>
-          </a:p>
-        </p:txBody>
-      </p:sp>
       <p:grpSp>
         <p:nvGrpSpPr>
           <p:cNvPr id="107" name="Shape 107"/>
@@ -11158,6 +11119,25 @@
           </p:spPr>
         </p:sp>
       </p:grpSp>
+      <p:sp>
+        <p:nvSpPr>
+          <p:cNvPr id="3" name="Slide Number Placeholder 2"/>
+          <p:cNvSpPr>
+            <a:spLocks noGrp="1"/>
+          </p:cNvSpPr>
+          <p:nvPr>
+            <p:ph type="sldNum" idx="12"/>
+          </p:nvPr>
+        </p:nvSpPr>
+        <p:spPr/>
+        <p:txBody>
+          <a:bodyPr/>
+          <a:lstStyle/>
+          <a:p>
+            <a:endParaRPr lang="en-US"/>
+          </a:p>
+        </p:txBody>
+      </p:sp>
     </p:spTree>
   </p:cSld>
   <p:clrMapOvr>
@@ -11368,6 +11348,25 @@
           </a:p>
         </p:txBody>
       </p:sp>
+      <p:sp>
+        <p:nvSpPr>
+          <p:cNvPr id="3" name="Slide Number Placeholder 2"/>
+          <p:cNvSpPr>
+            <a:spLocks noGrp="1"/>
+          </p:cNvSpPr>
+          <p:nvPr>
+            <p:ph type="sldNum" idx="12"/>
+          </p:nvPr>
+        </p:nvSpPr>
+        <p:spPr/>
+        <p:txBody>
+          <a:bodyPr/>
+          <a:lstStyle/>
+          <a:p>
+            <a:endParaRPr lang="en-US"/>
+          </a:p>
+        </p:txBody>
+      </p:sp>
     </p:spTree>
   </p:cSld>
   <p:clrMapOvr>
@@ -11612,6 +11611,25 @@
                 <a:srgbClr val="000000"/>
               </a:solidFill>
             </a:endParaRPr>
+          </a:p>
+        </p:txBody>
+      </p:sp>
+      <p:sp>
+        <p:nvSpPr>
+          <p:cNvPr id="3" name="Slide Number Placeholder 2"/>
+          <p:cNvSpPr>
+            <a:spLocks noGrp="1"/>
+          </p:cNvSpPr>
+          <p:nvPr>
+            <p:ph type="sldNum" idx="12"/>
+          </p:nvPr>
+        </p:nvSpPr>
+        <p:spPr/>
+        <p:txBody>
+          <a:bodyPr/>
+          <a:lstStyle/>
+          <a:p>
+            <a:endParaRPr lang="en-US"/>
           </a:p>
         </p:txBody>
       </p:sp>
@@ -12142,6 +12160,25 @@
           </a:p>
         </p:txBody>
       </p:sp>
+      <p:sp>
+        <p:nvSpPr>
+          <p:cNvPr id="3" name="Slide Number Placeholder 2"/>
+          <p:cNvSpPr>
+            <a:spLocks noGrp="1"/>
+          </p:cNvSpPr>
+          <p:nvPr>
+            <p:ph type="sldNum" idx="12"/>
+          </p:nvPr>
+        </p:nvSpPr>
+        <p:spPr/>
+        <p:txBody>
+          <a:bodyPr/>
+          <a:lstStyle/>
+          <a:p>
+            <a:endParaRPr lang="en-US"/>
+          </a:p>
+        </p:txBody>
+      </p:sp>
     </p:spTree>
   </p:cSld>
   <p:clrMapOvr>
@@ -12514,6 +12551,25 @@
           </a:p>
         </p:txBody>
       </p:sp>
+      <p:sp>
+        <p:nvSpPr>
+          <p:cNvPr id="5" name="Slide Number Placeholder 4"/>
+          <p:cNvSpPr>
+            <a:spLocks noGrp="1"/>
+          </p:cNvSpPr>
+          <p:nvPr>
+            <p:ph type="sldNum" idx="12"/>
+          </p:nvPr>
+        </p:nvSpPr>
+        <p:spPr/>
+        <p:txBody>
+          <a:bodyPr/>
+          <a:lstStyle/>
+          <a:p>
+            <a:endParaRPr lang="en-US"/>
+          </a:p>
+        </p:txBody>
+      </p:sp>
     </p:spTree>
     <p:extLst>
       <p:ext uri="{BB962C8B-B14F-4D97-AF65-F5344CB8AC3E}">
@@ -12689,6 +12745,25 @@
           </a:p>
         </p:txBody>
       </p:sp>
+      <p:sp>
+        <p:nvSpPr>
+          <p:cNvPr id="3" name="Slide Number Placeholder 2"/>
+          <p:cNvSpPr>
+            <a:spLocks noGrp="1"/>
+          </p:cNvSpPr>
+          <p:nvPr>
+            <p:ph type="sldNum" idx="12"/>
+          </p:nvPr>
+        </p:nvSpPr>
+        <p:spPr/>
+        <p:txBody>
+          <a:bodyPr/>
+          <a:lstStyle/>
+          <a:p>
+            <a:endParaRPr lang="en-US"/>
+          </a:p>
+        </p:txBody>
+      </p:sp>
     </p:spTree>
   </p:cSld>
   <p:clrMapOvr>
@@ -12772,6 +12847,25 @@
               <a:rPr lang="en-US" dirty="0"/>
               <a:t>A second offense (or a sufficiently major first offense) may result in penalties up to and including dismissal from the program.  [This has happened!!]</a:t>
             </a:r>
+          </a:p>
+        </p:txBody>
+      </p:sp>
+      <p:sp>
+        <p:nvSpPr>
+          <p:cNvPr id="5" name="Slide Number Placeholder 4"/>
+          <p:cNvSpPr>
+            <a:spLocks noGrp="1"/>
+          </p:cNvSpPr>
+          <p:nvPr>
+            <p:ph type="sldNum" idx="12"/>
+          </p:nvPr>
+        </p:nvSpPr>
+        <p:spPr/>
+        <p:txBody>
+          <a:bodyPr/>
+          <a:lstStyle/>
+          <a:p>
+            <a:endParaRPr lang="en-US"/>
           </a:p>
         </p:txBody>
       </p:sp>
@@ -12922,6 +13016,25 @@
           </a:p>
         </p:txBody>
       </p:sp>
+      <p:sp>
+        <p:nvSpPr>
+          <p:cNvPr id="3" name="Slide Number Placeholder 2"/>
+          <p:cNvSpPr>
+            <a:spLocks noGrp="1"/>
+          </p:cNvSpPr>
+          <p:nvPr>
+            <p:ph type="sldNum" idx="12"/>
+          </p:nvPr>
+        </p:nvSpPr>
+        <p:spPr/>
+        <p:txBody>
+          <a:bodyPr/>
+          <a:lstStyle/>
+          <a:p>
+            <a:endParaRPr lang="en-US"/>
+          </a:p>
+        </p:txBody>
+      </p:sp>
     </p:spTree>
   </p:cSld>
   <p:clrMapOvr>
@@ -13083,6 +13196,25 @@
           </a:p>
         </p:txBody>
       </p:sp>
+      <p:sp>
+        <p:nvSpPr>
+          <p:cNvPr id="3" name="Slide Number Placeholder 2"/>
+          <p:cNvSpPr>
+            <a:spLocks noGrp="1"/>
+          </p:cNvSpPr>
+          <p:nvPr>
+            <p:ph type="sldNum" idx="12"/>
+          </p:nvPr>
+        </p:nvSpPr>
+        <p:spPr/>
+        <p:txBody>
+          <a:bodyPr/>
+          <a:lstStyle/>
+          <a:p>
+            <a:endParaRPr lang="en-US"/>
+          </a:p>
+        </p:txBody>
+      </p:sp>
     </p:spTree>
   </p:cSld>
   <p:clrMapOvr>
@@ -13262,6 +13394,25 @@
           </a:p>
         </p:txBody>
       </p:sp>
+      <p:sp>
+        <p:nvSpPr>
+          <p:cNvPr id="3" name="Slide Number Placeholder 2"/>
+          <p:cNvSpPr>
+            <a:spLocks noGrp="1"/>
+          </p:cNvSpPr>
+          <p:nvPr>
+            <p:ph type="sldNum" idx="12"/>
+          </p:nvPr>
+        </p:nvSpPr>
+        <p:spPr/>
+        <p:txBody>
+          <a:bodyPr/>
+          <a:lstStyle/>
+          <a:p>
+            <a:endParaRPr lang="en-US"/>
+          </a:p>
+        </p:txBody>
+      </p:sp>
     </p:spTree>
   </p:cSld>
   <p:clrMapOvr>
@@ -13351,6 +13502,25 @@
               <a:rPr lang="en-US" dirty="0"/>
               <a:t>If you need to show your course work to a prospective employer, put it on Dropbox and give them a private link.</a:t>
             </a:r>
+          </a:p>
+        </p:txBody>
+      </p:sp>
+      <p:sp>
+        <p:nvSpPr>
+          <p:cNvPr id="5" name="Slide Number Placeholder 4"/>
+          <p:cNvSpPr>
+            <a:spLocks noGrp="1"/>
+          </p:cNvSpPr>
+          <p:nvPr>
+            <p:ph type="sldNum" idx="12"/>
+          </p:nvPr>
+        </p:nvSpPr>
+        <p:spPr/>
+        <p:txBody>
+          <a:bodyPr/>
+          <a:lstStyle/>
+          <a:p>
+            <a:endParaRPr lang="en-US"/>
           </a:p>
         </p:txBody>
       </p:sp>
@@ -13468,12 +13638,12 @@
       </p:sp>
       <p:sp>
         <p:nvSpPr>
-          <p:cNvPr id="4" name="Slide Number Placeholder 3"/>
+          <p:cNvPr id="6" name="Slide Number Placeholder 5"/>
           <p:cNvSpPr>
             <a:spLocks noGrp="1"/>
           </p:cNvSpPr>
           <p:nvPr>
-            <p:ph type="sldNum" sz="quarter" idx="12"/>
+            <p:ph type="sldNum" idx="12"/>
           </p:nvPr>
         </p:nvSpPr>
         <p:spPr/>
@@ -13481,10 +13651,6 @@
           <a:bodyPr/>
           <a:lstStyle/>
           <a:p>
-            <a:fld id="{2AF3B5EA-18B6-4040-9F78-6052AF49C681}" type="slidenum">
-              <a:rPr lang="en-US" smtClean="0"/>
-              <a:t>2</a:t>
-            </a:fld>
             <a:endParaRPr lang="en-US"/>
           </a:p>
         </p:txBody>
@@ -13641,6 +13807,25 @@
           </a:p>
         </p:txBody>
       </p:sp>
+      <p:sp>
+        <p:nvSpPr>
+          <p:cNvPr id="3" name="Slide Number Placeholder 2"/>
+          <p:cNvSpPr>
+            <a:spLocks noGrp="1"/>
+          </p:cNvSpPr>
+          <p:nvPr>
+            <p:ph type="sldNum" idx="12"/>
+          </p:nvPr>
+        </p:nvSpPr>
+        <p:spPr/>
+        <p:txBody>
+          <a:bodyPr/>
+          <a:lstStyle/>
+          <a:p>
+            <a:endParaRPr lang="en-US"/>
+          </a:p>
+        </p:txBody>
+      </p:sp>
     </p:spTree>
   </p:cSld>
   <p:clrMapOvr>
@@ -13743,12 +13928,12 @@
       </p:sp>
       <p:sp>
         <p:nvSpPr>
-          <p:cNvPr id="4" name="Slide Number Placeholder 3"/>
+          <p:cNvPr id="6" name="Slide Number Placeholder 5"/>
           <p:cNvSpPr>
             <a:spLocks noGrp="1"/>
           </p:cNvSpPr>
           <p:nvPr>
-            <p:ph type="sldNum" sz="quarter" idx="12"/>
+            <p:ph type="sldNum" idx="12"/>
           </p:nvPr>
         </p:nvSpPr>
         <p:spPr/>
@@ -13756,10 +13941,6 @@
           <a:bodyPr/>
           <a:lstStyle/>
           <a:p>
-            <a:fld id="{2AF3B5EA-18B6-4040-9F78-6052AF49C681}" type="slidenum">
-              <a:rPr lang="en-US" smtClean="0"/>
-              <a:t>21</a:t>
-            </a:fld>
             <a:endParaRPr lang="en-US"/>
           </a:p>
         </p:txBody>
@@ -13850,12 +14031,12 @@
       </p:sp>
       <p:sp>
         <p:nvSpPr>
-          <p:cNvPr id="4" name="Slide Number Placeholder 3"/>
+          <p:cNvPr id="6" name="Slide Number Placeholder 5"/>
           <p:cNvSpPr>
             <a:spLocks noGrp="1"/>
           </p:cNvSpPr>
           <p:nvPr>
-            <p:ph type="sldNum" sz="quarter" idx="12"/>
+            <p:ph type="sldNum" idx="12"/>
           </p:nvPr>
         </p:nvSpPr>
         <p:spPr/>
@@ -13863,10 +14044,6 @@
           <a:bodyPr/>
           <a:lstStyle/>
           <a:p>
-            <a:fld id="{2AF3B5EA-18B6-4040-9F78-6052AF49C681}" type="slidenum">
-              <a:rPr lang="en-US" smtClean="0"/>
-              <a:t>22</a:t>
-            </a:fld>
             <a:endParaRPr lang="en-US"/>
           </a:p>
         </p:txBody>
@@ -14068,6 +14245,25 @@
           </a:p>
         </p:txBody>
       </p:sp>
+      <p:sp>
+        <p:nvSpPr>
+          <p:cNvPr id="3" name="Slide Number Placeholder 2"/>
+          <p:cNvSpPr>
+            <a:spLocks noGrp="1"/>
+          </p:cNvSpPr>
+          <p:nvPr>
+            <p:ph type="sldNum" idx="12"/>
+          </p:nvPr>
+        </p:nvSpPr>
+        <p:spPr/>
+        <p:txBody>
+          <a:bodyPr/>
+          <a:lstStyle/>
+          <a:p>
+            <a:endParaRPr lang="en-US"/>
+          </a:p>
+        </p:txBody>
+      </p:sp>
     </p:spTree>
   </p:cSld>
   <p:clrMapOvr>
@@ -14237,6 +14433,25 @@
           </a:p>
         </p:txBody>
       </p:sp>
+      <p:sp>
+        <p:nvSpPr>
+          <p:cNvPr id="3" name="Slide Number Placeholder 2"/>
+          <p:cNvSpPr>
+            <a:spLocks noGrp="1"/>
+          </p:cNvSpPr>
+          <p:nvPr>
+            <p:ph type="sldNum" idx="12"/>
+          </p:nvPr>
+        </p:nvSpPr>
+        <p:spPr/>
+        <p:txBody>
+          <a:bodyPr/>
+          <a:lstStyle/>
+          <a:p>
+            <a:endParaRPr lang="en-US" dirty="0"/>
+          </a:p>
+        </p:txBody>
+      </p:sp>
     </p:spTree>
   </p:cSld>
   <p:clrMapOvr>
@@ -14382,6 +14597,25 @@
           </a:p>
         </p:txBody>
       </p:sp>
+      <p:sp>
+        <p:nvSpPr>
+          <p:cNvPr id="3" name="Slide Number Placeholder 2"/>
+          <p:cNvSpPr>
+            <a:spLocks noGrp="1"/>
+          </p:cNvSpPr>
+          <p:nvPr>
+            <p:ph type="sldNum" idx="12"/>
+          </p:nvPr>
+        </p:nvSpPr>
+        <p:spPr/>
+        <p:txBody>
+          <a:bodyPr/>
+          <a:lstStyle/>
+          <a:p>
+            <a:endParaRPr lang="en-US"/>
+          </a:p>
+        </p:txBody>
+      </p:sp>
     </p:spTree>
   </p:cSld>
   <p:clrMapOvr>
@@ -14463,6 +14697,25 @@
               <a:rPr lang="en-US" dirty="0"/>
               <a:t>Students who cheat in school are more likely to become employees who cheat.</a:t>
             </a:r>
+          </a:p>
+        </p:txBody>
+      </p:sp>
+      <p:sp>
+        <p:nvSpPr>
+          <p:cNvPr id="5" name="Slide Number Placeholder 4"/>
+          <p:cNvSpPr>
+            <a:spLocks noGrp="1"/>
+          </p:cNvSpPr>
+          <p:nvPr>
+            <p:ph type="sldNum" idx="12"/>
+          </p:nvPr>
+        </p:nvSpPr>
+        <p:spPr/>
+        <p:txBody>
+          <a:bodyPr/>
+          <a:lstStyle/>
+          <a:p>
+            <a:endParaRPr lang="en-US"/>
           </a:p>
         </p:txBody>
       </p:sp>
@@ -14624,6 +14877,25 @@
           </a:p>
         </p:txBody>
       </p:sp>
+      <p:sp>
+        <p:nvSpPr>
+          <p:cNvPr id="3" name="Slide Number Placeholder 2"/>
+          <p:cNvSpPr>
+            <a:spLocks noGrp="1"/>
+          </p:cNvSpPr>
+          <p:nvPr>
+            <p:ph type="sldNum" idx="12"/>
+          </p:nvPr>
+        </p:nvSpPr>
+        <p:spPr/>
+        <p:txBody>
+          <a:bodyPr/>
+          <a:lstStyle/>
+          <a:p>
+            <a:endParaRPr lang="en-US"/>
+          </a:p>
+        </p:txBody>
+      </p:sp>
     </p:spTree>
   </p:cSld>
   <p:clrMapOvr>
@@ -14900,6 +15172,25 @@
           </a:p>
         </p:txBody>
       </p:sp>
+      <p:sp>
+        <p:nvSpPr>
+          <p:cNvPr id="3" name="Slide Number Placeholder 2"/>
+          <p:cNvSpPr>
+            <a:spLocks noGrp="1"/>
+          </p:cNvSpPr>
+          <p:nvPr>
+            <p:ph type="sldNum" idx="12"/>
+          </p:nvPr>
+        </p:nvSpPr>
+        <p:spPr/>
+        <p:txBody>
+          <a:bodyPr/>
+          <a:lstStyle/>
+          <a:p>
+            <a:endParaRPr lang="en-US"/>
+          </a:p>
+        </p:txBody>
+      </p:sp>
     </p:spTree>
   </p:cSld>
   <p:clrMapOvr>
@@ -15113,6 +15404,25 @@
                 <a:srgbClr val="000000"/>
               </a:solidFill>
             </a:endParaRPr>
+          </a:p>
+        </p:txBody>
+      </p:sp>
+      <p:sp>
+        <p:nvSpPr>
+          <p:cNvPr id="3" name="Slide Number Placeholder 2"/>
+          <p:cNvSpPr>
+            <a:spLocks noGrp="1"/>
+          </p:cNvSpPr>
+          <p:nvPr>
+            <p:ph type="sldNum" idx="12"/>
+          </p:nvPr>
+        </p:nvSpPr>
+        <p:spPr/>
+        <p:txBody>
+          <a:bodyPr/>
+          <a:lstStyle/>
+          <a:p>
+            <a:endParaRPr lang="en-US"/>
           </a:p>
         </p:txBody>
       </p:sp>

</xml_diff>